<commit_message>
fundamental question added, courtesy Ninad
</commit_message>
<xml_diff>
--- a/research_showcase/dynamicProgramming_aryan_ritwajeet_jha.pptx
+++ b/research_showcase/dynamicProgramming_aryan_ritwajeet_jha.pptx
@@ -5,10 +5,10 @@
     <p:sldMasterId id="2147483686" r:id="rId1"/>
   </p:sldMasterIdLst>
   <p:notesMasterIdLst>
-    <p:notesMasterId r:id="rId12"/>
+    <p:notesMasterId r:id="rId11"/>
   </p:notesMasterIdLst>
   <p:handoutMasterIdLst>
-    <p:handoutMasterId r:id="rId13"/>
+    <p:handoutMasterId r:id="rId12"/>
   </p:handoutMasterIdLst>
   <p:sldIdLst>
     <p:sldId id="257" r:id="rId2"/>
@@ -17,10 +17,9 @@
     <p:sldId id="282" r:id="rId5"/>
     <p:sldId id="281" r:id="rId6"/>
     <p:sldId id="283" r:id="rId7"/>
-    <p:sldId id="267" r:id="rId8"/>
-    <p:sldId id="277" r:id="rId9"/>
+    <p:sldId id="284" r:id="rId8"/>
+    <p:sldId id="285" r:id="rId9"/>
     <p:sldId id="270" r:id="rId10"/>
-    <p:sldId id="273" r:id="rId11"/>
   </p:sldIdLst>
   <p:sldSz cx="12192000" cy="6858000"/>
   <p:notesSz cx="6858000" cy="9144000"/>
@@ -6251,112 +6250,6 @@
 </p:sld>
 </file>
 
-<file path=ppt/slides/slide10.xml><?xml version="1.0" encoding="utf-8"?>
-<p:sld xmlns:a="http://schemas.openxmlformats.org/drawingml/2006/main" xmlns:r="http://schemas.openxmlformats.org/officeDocument/2006/relationships" xmlns:p="http://schemas.openxmlformats.org/presentationml/2006/main">
-  <p:cSld>
-    <p:spTree>
-      <p:nvGrpSpPr>
-        <p:cNvPr id="1" name=""/>
-        <p:cNvGrpSpPr/>
-        <p:nvPr/>
-      </p:nvGrpSpPr>
-      <p:grpSpPr>
-        <a:xfrm>
-          <a:off x="0" y="0"/>
-          <a:ext cx="0" cy="0"/>
-          <a:chOff x="0" y="0"/>
-          <a:chExt cx="0" cy="0"/>
-        </a:xfrm>
-      </p:grpSpPr>
-      <p:sp>
-        <p:nvSpPr>
-          <p:cNvPr id="34" name="Title 33">
-            <a:extLst>
-              <a:ext uri="{FF2B5EF4-FFF2-40B4-BE49-F238E27FC236}">
-                <a16:creationId xmlns:a16="http://schemas.microsoft.com/office/drawing/2014/main" id="{8AC96926-49B1-4DFB-A717-827828860CC4}"/>
-              </a:ext>
-            </a:extLst>
-          </p:cNvPr>
-          <p:cNvSpPr>
-            <a:spLocks noGrp="1"/>
-          </p:cNvSpPr>
-          <p:nvPr>
-            <p:ph type="title"/>
-          </p:nvPr>
-        </p:nvSpPr>
-        <p:spPr>
-          <a:xfrm>
-            <a:off x="1079404" y="920635"/>
-            <a:ext cx="8691516" cy="1329595"/>
-          </a:xfrm>
-        </p:spPr>
-        <p:txBody>
-          <a:bodyPr/>
-          <a:lstStyle/>
-          <a:p>
-            <a:r>
-              <a:rPr lang="en-US" dirty="0"/>
-              <a:t>LOCA VORE CARDIGAN SHORTS CHARTREUSE</a:t>
-            </a:r>
-          </a:p>
-        </p:txBody>
-      </p:sp>
-      <p:sp>
-        <p:nvSpPr>
-          <p:cNvPr id="6" name="Content Placeholder 5">
-            <a:extLst>
-              <a:ext uri="{FF2B5EF4-FFF2-40B4-BE49-F238E27FC236}">
-                <a16:creationId xmlns:a16="http://schemas.microsoft.com/office/drawing/2014/main" id="{F79BD561-90E0-4007-A8CB-DAF84D917E20}"/>
-              </a:ext>
-            </a:extLst>
-          </p:cNvPr>
-          <p:cNvSpPr>
-            <a:spLocks noGrp="1"/>
-          </p:cNvSpPr>
-          <p:nvPr>
-            <p:ph type="body" sz="quarter" idx="13"/>
-          </p:nvPr>
-        </p:nvSpPr>
-        <p:spPr>
-          <a:xfrm>
-            <a:off x="2504210" y="3140123"/>
-            <a:ext cx="7190508" cy="2997441"/>
-          </a:xfrm>
-        </p:spPr>
-        <p:txBody>
-          <a:bodyPr>
-            <a:spAutoFit/>
-          </a:bodyPr>
-          <a:lstStyle/>
-          <a:p>
-            <a:r>
-              <a:rPr lang="en-US" dirty="0"/>
-              <a:t>Banh mi polaroid church-key skateboard gastropub, you probably haven't heard of them cardigan tofu hoodie. Health goth literally chartreuse, fixie hashtag hexagon humblebrag heirloom fashion axe </a:t>
-            </a:r>
-            <a:r>
-              <a:rPr lang="en-US" dirty="0" err="1"/>
-              <a:t>chicharrones</a:t>
-            </a:r>
-            <a:r>
-              <a:rPr lang="en-US" dirty="0"/>
-              <a:t>.</a:t>
-            </a:r>
-          </a:p>
-        </p:txBody>
-      </p:sp>
-    </p:spTree>
-    <p:extLst>
-      <p:ext uri="{BB962C8B-B14F-4D97-AF65-F5344CB8AC3E}">
-        <p14:creationId xmlns:p14="http://schemas.microsoft.com/office/powerpoint/2010/main" val="2885085244"/>
-      </p:ext>
-    </p:extLst>
-  </p:cSld>
-  <p:clrMapOvr>
-    <a:masterClrMapping/>
-  </p:clrMapOvr>
-</p:sld>
-</file>
-
 <file path=ppt/slides/slide2.xml><?xml version="1.0" encoding="utf-8"?>
 <p:sld xmlns:a="http://schemas.openxmlformats.org/drawingml/2006/main" xmlns:r="http://schemas.openxmlformats.org/officeDocument/2006/relationships" xmlns:p="http://schemas.openxmlformats.org/presentationml/2006/main">
   <p:cSld>
@@ -7136,10 +7029,159 @@
           <a:chExt cx="0" cy="0"/>
         </a:xfrm>
       </p:grpSpPr>
+      <p:sp>
+        <p:nvSpPr>
+          <p:cNvPr id="2" name="Text Placeholder 1">
+            <a:extLst>
+              <a:ext uri="{FF2B5EF4-FFF2-40B4-BE49-F238E27FC236}">
+                <a16:creationId xmlns:a16="http://schemas.microsoft.com/office/drawing/2014/main" id="{115CECA0-66F8-A232-293C-9BB14E71485D}"/>
+              </a:ext>
+            </a:extLst>
+          </p:cNvPr>
+          <p:cNvSpPr>
+            <a:spLocks noGrp="1"/>
+          </p:cNvSpPr>
+          <p:nvPr>
+            <p:ph type="body" idx="1"/>
+          </p:nvPr>
+        </p:nvSpPr>
+        <p:spPr>
+          <a:xfrm>
+            <a:off x="377719" y="1478942"/>
+            <a:ext cx="11059661" cy="5273130"/>
+          </a:xfrm>
+        </p:spPr>
+        <p:txBody>
+          <a:bodyPr/>
+          <a:lstStyle/>
+          <a:p>
+            <a:r>
+              <a:rPr lang="en-IN" sz="2800" dirty="0"/>
+              <a:t>Instead of using dynamic programming and optimization on </a:t>
+            </a:r>
+          </a:p>
+          <a:p>
+            <a:pPr marL="457200" indent="-457200">
+              <a:buFont typeface="Arial" panose="020B0604020202020204" pitchFamily="34" charset="0"/>
+              <a:buChar char="•"/>
+            </a:pPr>
+            <a:r>
+              <a:rPr lang="en-IN" sz="2800" dirty="0"/>
+              <a:t>N state variables (including memory elements like Battery SOC) </a:t>
+            </a:r>
+          </a:p>
+          <a:p>
+            <a:pPr marL="457200" indent="-457200">
+              <a:buFont typeface="Arial" panose="020B0604020202020204" pitchFamily="34" charset="0"/>
+              <a:buChar char="•"/>
+            </a:pPr>
+            <a:r>
+              <a:rPr lang="en-IN" sz="2800" dirty="0"/>
+              <a:t>C constraints for T time steps</a:t>
+            </a:r>
+          </a:p>
+          <a:p>
+            <a:pPr marL="457200" indent="-457200">
+              <a:buFont typeface="Arial" panose="020B0604020202020204" pitchFamily="34" charset="0"/>
+              <a:buChar char="•"/>
+            </a:pPr>
+            <a:endParaRPr lang="en-IN" sz="2800" dirty="0"/>
+          </a:p>
+          <a:p>
+            <a:r>
+              <a:rPr lang="en-IN" sz="2800" dirty="0"/>
+              <a:t>Why not just form:</a:t>
+            </a:r>
+          </a:p>
+          <a:p>
+            <a:pPr marL="457200" indent="-457200">
+              <a:buFont typeface="Arial" panose="020B0604020202020204" pitchFamily="34" charset="0"/>
+              <a:buChar char="•"/>
+            </a:pPr>
+            <a:r>
+              <a:rPr lang="en-IN" sz="2800" dirty="0"/>
+              <a:t> N*T state variables (including Battery SOC)</a:t>
+            </a:r>
+          </a:p>
+          <a:p>
+            <a:pPr marL="457200" indent="-457200">
+              <a:buFont typeface="Arial" panose="020B0604020202020204" pitchFamily="34" charset="0"/>
+              <a:buChar char="•"/>
+            </a:pPr>
+            <a:r>
+              <a:rPr lang="en-IN" sz="2800" dirty="0"/>
+              <a:t>C*T constraints plus T additional constraints to maintain </a:t>
+            </a:r>
+            <a:r>
+              <a:rPr lang="en-IN" sz="2800" i="1" dirty="0"/>
+              <a:t>continuity </a:t>
+            </a:r>
+            <a:r>
+              <a:rPr lang="en-IN" sz="2800" dirty="0"/>
+              <a:t>for those memory elements. </a:t>
+            </a:r>
+            <a:r>
+              <a:rPr lang="en-IN" sz="1800" dirty="0"/>
+              <a:t>(Let’s assume just one battery in our whole grid)</a:t>
+            </a:r>
+            <a:endParaRPr lang="en-IN" sz="2800" dirty="0"/>
+          </a:p>
+          <a:p>
+            <a:pPr marL="457200" indent="-457200">
+              <a:buFont typeface="Arial" panose="020B0604020202020204" pitchFamily="34" charset="0"/>
+              <a:buChar char="•"/>
+            </a:pPr>
+            <a:r>
+              <a:rPr lang="en-IN" sz="2800" dirty="0"/>
+              <a:t>All into one big ‘steady-state-like’ Optimization problem and plug it into a solver?</a:t>
+            </a:r>
+          </a:p>
+          <a:p>
+            <a:pPr marL="457200" indent="-457200">
+              <a:buFont typeface="Arial" panose="020B0604020202020204" pitchFamily="34" charset="0"/>
+              <a:buChar char="•"/>
+            </a:pPr>
+            <a:endParaRPr lang="en-IN" sz="2800" dirty="0"/>
+          </a:p>
+        </p:txBody>
+      </p:sp>
+      <p:sp>
+        <p:nvSpPr>
+          <p:cNvPr id="3" name="Title 2">
+            <a:extLst>
+              <a:ext uri="{FF2B5EF4-FFF2-40B4-BE49-F238E27FC236}">
+                <a16:creationId xmlns:a16="http://schemas.microsoft.com/office/drawing/2014/main" id="{7E0B44CE-9DAE-23DB-0CD5-295D7AA6AFA4}"/>
+              </a:ext>
+            </a:extLst>
+          </p:cNvPr>
+          <p:cNvSpPr>
+            <a:spLocks noGrp="1"/>
+          </p:cNvSpPr>
+          <p:nvPr>
+            <p:ph type="title"/>
+          </p:nvPr>
+        </p:nvSpPr>
+        <p:spPr>
+          <a:xfrm>
+            <a:off x="875967" y="190380"/>
+            <a:ext cx="10063163" cy="1073877"/>
+          </a:xfrm>
+        </p:spPr>
+        <p:txBody>
+          <a:bodyPr/>
+          <a:lstStyle/>
+          <a:p>
+            <a:r>
+              <a:rPr lang="en-IN" dirty="0"/>
+              <a:t>Do we even need a dynamic programming formulation in Power Systems?</a:t>
+            </a:r>
+          </a:p>
+        </p:txBody>
+      </p:sp>
     </p:spTree>
     <p:extLst>
       <p:ext uri="{BB962C8B-B14F-4D97-AF65-F5344CB8AC3E}">
-        <p14:creationId xmlns:p14="http://schemas.microsoft.com/office/powerpoint/2010/main" val="1059548903"/>
+        <p14:creationId xmlns:p14="http://schemas.microsoft.com/office/powerpoint/2010/main" val="3830537030"/>
       </p:ext>
     </p:extLst>
   </p:cSld>
@@ -7168,10 +7210,89 @@
       </p:grpSpPr>
       <p:sp>
         <p:nvSpPr>
-          <p:cNvPr id="34" name="Title 33">
+          <p:cNvPr id="2" name="Text Placeholder 1">
             <a:extLst>
               <a:ext uri="{FF2B5EF4-FFF2-40B4-BE49-F238E27FC236}">
-                <a16:creationId xmlns:a16="http://schemas.microsoft.com/office/drawing/2014/main" id="{8AC96926-49B1-4DFB-A717-827828860CC4}"/>
+                <a16:creationId xmlns:a16="http://schemas.microsoft.com/office/drawing/2014/main" id="{115CECA0-66F8-A232-293C-9BB14E71485D}"/>
+              </a:ext>
+            </a:extLst>
+          </p:cNvPr>
+          <p:cNvSpPr>
+            <a:spLocks noGrp="1"/>
+          </p:cNvSpPr>
+          <p:nvPr>
+            <p:ph type="body" idx="1"/>
+          </p:nvPr>
+        </p:nvSpPr>
+        <p:spPr>
+          <a:xfrm>
+            <a:off x="401573" y="1423282"/>
+            <a:ext cx="11059661" cy="5273130"/>
+          </a:xfrm>
+        </p:spPr>
+        <p:txBody>
+          <a:bodyPr/>
+          <a:lstStyle/>
+          <a:p>
+            <a:r>
+              <a:rPr lang="en-IN" sz="2800" dirty="0"/>
+              <a:t>Instead of using dynamic programming and optimization, why not just incorporate more state variables, more constraints (both by a factor of the number of time-steps: T) into one big ‘steady-state-like’ Optimization problem and plug it into a solver?</a:t>
+            </a:r>
+          </a:p>
+          <a:p>
+            <a:pPr marL="457200" indent="-457200">
+              <a:buFont typeface="Arial" panose="020B0604020202020204" pitchFamily="34" charset="0"/>
+              <a:buChar char="•"/>
+            </a:pPr>
+            <a:endParaRPr lang="en-IN" sz="2800" dirty="0"/>
+          </a:p>
+          <a:p>
+            <a:r>
+              <a:rPr lang="en-IN" sz="2800" dirty="0">
+                <a:solidFill>
+                  <a:srgbClr val="C00000"/>
+                </a:solidFill>
+                <a:highlight>
+                  <a:srgbClr val="C0C0C0"/>
+                </a:highlight>
+              </a:rPr>
+              <a:t>I do not have an answer for this now, I’d imagine that the time complexity will increase exponentially, but that’s just </a:t>
+            </a:r>
+            <a:r>
+              <a:rPr lang="en-IN" sz="2800">
+                <a:solidFill>
+                  <a:srgbClr val="C00000"/>
+                </a:solidFill>
+                <a:highlight>
+                  <a:srgbClr val="C0C0C0"/>
+                </a:highlight>
+              </a:rPr>
+              <a:t>my speculation.</a:t>
+            </a:r>
+            <a:endParaRPr lang="en-IN" sz="2800" dirty="0">
+              <a:solidFill>
+                <a:srgbClr val="C00000"/>
+              </a:solidFill>
+              <a:highlight>
+                <a:srgbClr val="C0C0C0"/>
+              </a:highlight>
+            </a:endParaRPr>
+          </a:p>
+          <a:p>
+            <a:pPr marL="457200" indent="-457200">
+              <a:buFont typeface="Arial" panose="020B0604020202020204" pitchFamily="34" charset="0"/>
+              <a:buChar char="•"/>
+            </a:pPr>
+            <a:endParaRPr lang="en-IN" sz="2800" dirty="0"/>
+          </a:p>
+        </p:txBody>
+      </p:sp>
+      <p:sp>
+        <p:nvSpPr>
+          <p:cNvPr id="3" name="Title 2">
+            <a:extLst>
+              <a:ext uri="{FF2B5EF4-FFF2-40B4-BE49-F238E27FC236}">
+                <a16:creationId xmlns:a16="http://schemas.microsoft.com/office/drawing/2014/main" id="{7E0B44CE-9DAE-23DB-0CD5-295D7AA6AFA4}"/>
               </a:ext>
             </a:extLst>
           </p:cNvPr>
@@ -7184,8 +7305,8 @@
         </p:nvSpPr>
         <p:spPr>
           <a:xfrm>
-            <a:off x="1079404" y="627807"/>
-            <a:ext cx="7171757" cy="1272756"/>
+            <a:off x="899821" y="161588"/>
+            <a:ext cx="10063163" cy="1073877"/>
           </a:xfrm>
         </p:spPr>
         <p:txBody>
@@ -7193,51 +7314,8 @@
           <a:lstStyle/>
           <a:p>
             <a:r>
-              <a:rPr lang="en-US" dirty="0"/>
-              <a:t>LOCA VORE CARDIGAN SHORTS CHARTREUSE</a:t>
-            </a:r>
-          </a:p>
-        </p:txBody>
-      </p:sp>
-      <p:sp>
-        <p:nvSpPr>
-          <p:cNvPr id="6" name="Content Placeholder 5">
-            <a:extLst>
-              <a:ext uri="{FF2B5EF4-FFF2-40B4-BE49-F238E27FC236}">
-                <a16:creationId xmlns:a16="http://schemas.microsoft.com/office/drawing/2014/main" id="{F79BD561-90E0-4007-A8CB-DAF84D917E20}"/>
-              </a:ext>
-            </a:extLst>
-          </p:cNvPr>
-          <p:cNvSpPr>
-            <a:spLocks noGrp="1"/>
-          </p:cNvSpPr>
-          <p:nvPr>
-            <p:ph type="body" sz="quarter" idx="13"/>
-          </p:nvPr>
-        </p:nvSpPr>
-        <p:spPr>
-          <a:xfrm>
-            <a:off x="1079404" y="2469732"/>
-            <a:ext cx="5264150" cy="4041599"/>
-          </a:xfrm>
-        </p:spPr>
-        <p:txBody>
-          <a:bodyPr>
-            <a:spAutoFit/>
-          </a:bodyPr>
-          <a:lstStyle/>
-          <a:p>
-            <a:r>
-              <a:rPr lang="en-US" dirty="0"/>
-              <a:t>Banh mi polaroid church-key skateboard gastropub, you probably haven't heard of them cardigan tofu hoodie. Health goth literally chartreuse, fixie hashtag hexagon humblebrag heirloom fashion axe </a:t>
-            </a:r>
-            <a:r>
-              <a:rPr lang="en-US" dirty="0" err="1"/>
-              <a:t>chicharrones</a:t>
-            </a:r>
-            <a:r>
-              <a:rPr lang="en-US" dirty="0"/>
-              <a:t>.</a:t>
+              <a:rPr lang="en-IN" dirty="0"/>
+              <a:t>Do we even need a dynamic programming formulation in Power Systems?</a:t>
             </a:r>
           </a:p>
         </p:txBody>
@@ -7245,7 +7323,7 @@
     </p:spTree>
     <p:extLst>
       <p:ext uri="{BB962C8B-B14F-4D97-AF65-F5344CB8AC3E}">
-        <p14:creationId xmlns:p14="http://schemas.microsoft.com/office/powerpoint/2010/main" val="1781137045"/>
+        <p14:creationId xmlns:p14="http://schemas.microsoft.com/office/powerpoint/2010/main" val="504984678"/>
       </p:ext>
     </p:extLst>
   </p:cSld>

</xml_diff>